<commit_message>
Changed section 2 of the word doc
</commit_message>
<xml_diff>
--- a/First_Delivery/presentation/Lab02-PresentationTemplate.pptx
+++ b/First_Delivery/presentation/Lab02-PresentationTemplate.pptx
@@ -5,10 +5,10 @@
     <p:sldMasterId id="2147483648" r:id="rId1"/>
   </p:sldMasterIdLst>
   <p:notesMasterIdLst>
-    <p:notesMasterId r:id="rId11"/>
+    <p:notesMasterId r:id="rId12"/>
   </p:notesMasterIdLst>
   <p:handoutMasterIdLst>
-    <p:handoutMasterId r:id="rId12"/>
+    <p:handoutMasterId r:id="rId13"/>
   </p:handoutMasterIdLst>
   <p:sldIdLst>
     <p:sldId id="256" r:id="rId2"/>
@@ -20,6 +20,7 @@
     <p:sldId id="1102" r:id="rId8"/>
     <p:sldId id="1103" r:id="rId9"/>
     <p:sldId id="1104" r:id="rId10"/>
+    <p:sldId id="1105" r:id="rId11"/>
   </p:sldIdLst>
   <p:sldSz cx="9144000" cy="6858000" type="screen4x3"/>
   <p:notesSz cx="6858000" cy="9144000"/>
@@ -219,7 +220,7 @@
           <a:p>
             <a:fld id="{745C36E7-9E00-462E-80A3-32F2BE615C7A}" type="datetimeFigureOut">
               <a:rPr lang="en-US" smtClean="0"/>
-              <a:t>30-Sep-19</a:t>
+              <a:t>01-Oct-19</a:t>
             </a:fld>
             <a:endParaRPr lang="en-US"/>
           </a:p>
@@ -385,7 +386,7 @@
             <a:fld id="{01F3E309-ED8D-4193-99AF-E5EA90965E98}" type="datetimeFigureOut">
               <a:rPr lang="en-US" smtClean="0"/>
               <a:pPr/>
-              <a:t>30-Sep-19</a:t>
+              <a:t>01-Oct-19</a:t>
             </a:fld>
             <a:endParaRPr lang="en-US"/>
           </a:p>
@@ -1487,7 +1488,7 @@
             <a:fld id="{F3CC9924-33BC-4796-B0F9-D37DB5D899BF}" type="datetimeFigureOut">
               <a:rPr lang="pt-PT" smtClean="0"/>
               <a:pPr/>
-              <a:t>30/09/2019</a:t>
+              <a:t>01/10/2019</a:t>
             </a:fld>
             <a:endParaRPr lang="pt-PT"/>
           </a:p>
@@ -3488,6 +3489,72 @@
         </p:txBody>
       </p:sp>
     </p:spTree>
+  </p:cSld>
+  <p:clrMapOvr>
+    <a:masterClrMapping/>
+  </p:clrMapOvr>
+</p:sld>
+</file>
+
+<file path=ppt/slides/slide10.xml><?xml version="1.0" encoding="utf-8"?>
+<p:sld xmlns:a="http://schemas.openxmlformats.org/drawingml/2006/main" xmlns:r="http://schemas.openxmlformats.org/officeDocument/2006/relationships" xmlns:p="http://schemas.openxmlformats.org/presentationml/2006/main">
+  <p:cSld>
+    <p:spTree>
+      <p:nvGrpSpPr>
+        <p:cNvPr id="1" name=""/>
+        <p:cNvGrpSpPr/>
+        <p:nvPr/>
+      </p:nvGrpSpPr>
+      <p:grpSpPr>
+        <a:xfrm>
+          <a:off x="0" y="0"/>
+          <a:ext cx="0" cy="0"/>
+          <a:chOff x="0" y="0"/>
+          <a:chExt cx="0" cy="0"/>
+        </a:xfrm>
+      </p:grpSpPr>
+      <p:sp>
+        <p:nvSpPr>
+          <p:cNvPr id="3" name="Marcador de Posição de Conteúdo 2">
+            <a:extLst>
+              <a:ext uri="{FF2B5EF4-FFF2-40B4-BE49-F238E27FC236}">
+                <a16:creationId xmlns:a16="http://schemas.microsoft.com/office/drawing/2014/main" id="{074FC6D5-6BF3-4E77-B12A-66269FAFE45F}"/>
+              </a:ext>
+            </a:extLst>
+          </p:cNvPr>
+          <p:cNvSpPr>
+            <a:spLocks noGrp="1"/>
+          </p:cNvSpPr>
+          <p:nvPr>
+            <p:ph idx="1"/>
+          </p:nvPr>
+        </p:nvSpPr>
+        <p:spPr>
+          <a:xfrm>
+            <a:off x="457200" y="2348880"/>
+            <a:ext cx="8229600" cy="1639084"/>
+          </a:xfrm>
+        </p:spPr>
+        <p:txBody>
+          <a:bodyPr>
+            <a:normAutofit/>
+          </a:bodyPr>
+          <a:lstStyle/>
+          <a:p>
+            <a:pPr algn="ctr"/>
+            <a:r>
+              <a:rPr lang="pt-PT" sz="9600" dirty="0"/>
+              <a:t>QUESTIONS?</a:t>
+            </a:r>
+          </a:p>
+        </p:txBody>
+      </p:sp>
+    </p:spTree>
+    <p:extLst>
+      <p:ext uri="{BB962C8B-B14F-4D97-AF65-F5344CB8AC3E}">
+        <p14:creationId xmlns:p14="http://schemas.microsoft.com/office/powerpoint/2010/main" val="532739175"/>
+      </p:ext>
+    </p:extLst>
   </p:cSld>
   <p:clrMapOvr>
     <a:masterClrMapping/>

</xml_diff>

<commit_message>
Edited section 1 of the docx, and started editing ppt presentation
</commit_message>
<xml_diff>
--- a/First_Delivery/presentation/Lab02-PresentationTemplate.pptx
+++ b/First_Delivery/presentation/Lab02-PresentationTemplate.pptx
@@ -3680,6 +3680,41 @@
           <a:chExt cx="0" cy="0"/>
         </a:xfrm>
       </p:grpSpPr>
+      <p:pic>
+        <p:nvPicPr>
+          <p:cNvPr id="7" name="Imagem 6">
+            <a:extLst>
+              <a:ext uri="{FF2B5EF4-FFF2-40B4-BE49-F238E27FC236}">
+                <a16:creationId xmlns:a16="http://schemas.microsoft.com/office/drawing/2014/main" id="{24993B22-2D7A-4895-BE90-0C33DB2669BB}"/>
+              </a:ext>
+            </a:extLst>
+          </p:cNvPr>
+          <p:cNvPicPr>
+            <a:picLocks noChangeAspect="1"/>
+          </p:cNvPicPr>
+          <p:nvPr/>
+        </p:nvPicPr>
+        <p:blipFill rotWithShape="1">
+          <a:blip r:embed="rId3" cstate="print">
+            <a:extLst>
+              <a:ext uri="{28A0092B-C50C-407E-A947-70E740481C1C}">
+                <a14:useLocalDpi xmlns:a14="http://schemas.microsoft.com/office/drawing/2010/main" val="0"/>
+              </a:ext>
+            </a:extLst>
+          </a:blip>
+          <a:srcRect l="389"/>
+          <a:stretch/>
+        </p:blipFill>
+        <p:spPr>
+          <a:xfrm>
+            <a:off x="-32" y="738166"/>
+            <a:ext cx="9144032" cy="6119834"/>
+          </a:xfrm>
+          <a:prstGeom prst="rect">
+            <a:avLst/>
+          </a:prstGeom>
+        </p:spPr>
+      </p:pic>
       <p:sp>
         <p:nvSpPr>
           <p:cNvPr id="2" name="Title 1"/>
@@ -3713,7 +3748,12 @@
             <p:ph idx="1"/>
           </p:nvPr>
         </p:nvSpPr>
-        <p:spPr/>
+        <p:spPr>
+          <a:xfrm>
+            <a:off x="457200" y="1285860"/>
+            <a:ext cx="4762872" cy="5214974"/>
+          </a:xfrm>
+        </p:spPr>
         <p:txBody>
           <a:bodyPr>
             <a:noAutofit/>
@@ -3726,19 +3766,14 @@
             </a:r>
           </a:p>
           <a:p>
-            <a:pPr lvl="1"/>
-            <a:r>
-              <a:rPr lang="en-US" sz="3600" dirty="0"/>
-              <a:t>What will you be visualizing?</a:t>
-            </a:r>
-          </a:p>
-          <a:p>
-            <a:pPr lvl="1"/>
-            <a:r>
-              <a:rPr lang="en-US" sz="3600" dirty="0"/>
-              <a:t>Why is that relevant?</a:t>
-            </a:r>
-            <a:endParaRPr lang="en-US" dirty="0"/>
+            <a:r>
+              <a:rPr lang="en-US" sz="3600" b="0" dirty="0">
+                <a:solidFill>
+                  <a:schemeClr val="tx1"/>
+                </a:solidFill>
+              </a:rPr>
+              <a:t>Reading habits and academic success</a:t>
+            </a:r>
           </a:p>
         </p:txBody>
       </p:sp>
@@ -3921,20 +3956,6 @@
             <a:r>
               <a:rPr lang="en-US" sz="4000" dirty="0"/>
               <a:t>Dataset description</a:t>
-            </a:r>
-          </a:p>
-          <a:p>
-            <a:pPr lvl="1"/>
-            <a:r>
-              <a:rPr lang="en-US" sz="3600" dirty="0"/>
-              <a:t>Which dataset?</a:t>
-            </a:r>
-          </a:p>
-          <a:p>
-            <a:pPr lvl="1"/>
-            <a:r>
-              <a:rPr lang="en-US" sz="3600" dirty="0"/>
-              <a:t>How will you obtain the data?</a:t>
             </a:r>
           </a:p>
           <a:p>

</xml_diff>

<commit_message>
Changed section 1 of the docx and worked on ppt
</commit_message>
<xml_diff>
--- a/First_Delivery/presentation/Lab02-PresentationTemplate.pptx
+++ b/First_Delivery/presentation/Lab02-PresentationTemplate.pptx
@@ -5,10 +5,10 @@
     <p:sldMasterId id="2147483648" r:id="rId1"/>
   </p:sldMasterIdLst>
   <p:notesMasterIdLst>
-    <p:notesMasterId r:id="rId12"/>
+    <p:notesMasterId r:id="rId15"/>
   </p:notesMasterIdLst>
   <p:handoutMasterIdLst>
-    <p:handoutMasterId r:id="rId13"/>
+    <p:handoutMasterId r:id="rId16"/>
   </p:handoutMasterIdLst>
   <p:sldIdLst>
     <p:sldId id="256" r:id="rId2"/>
@@ -18,9 +18,12 @@
     <p:sldId id="1098" r:id="rId6"/>
     <p:sldId id="1101" r:id="rId7"/>
     <p:sldId id="1102" r:id="rId8"/>
-    <p:sldId id="1103" r:id="rId9"/>
-    <p:sldId id="1104" r:id="rId10"/>
-    <p:sldId id="1105" r:id="rId11"/>
+    <p:sldId id="1106" r:id="rId9"/>
+    <p:sldId id="1107" r:id="rId10"/>
+    <p:sldId id="1108" r:id="rId11"/>
+    <p:sldId id="1103" r:id="rId12"/>
+    <p:sldId id="1104" r:id="rId13"/>
+    <p:sldId id="1105" r:id="rId14"/>
   </p:sldIdLst>
   <p:sldSz cx="9144000" cy="6858000" type="screen4x3"/>
   <p:notesSz cx="6858000" cy="9144000"/>
@@ -977,7 +980,7 @@
             <a:fld id="{F535F173-C1DD-4975-94BF-5B9ED67F7674}" type="slidenum">
               <a:rPr lang="en-US" smtClean="0"/>
               <a:pPr/>
-              <a:t>9</a:t>
+              <a:t>12</a:t>
             </a:fld>
             <a:endParaRPr lang="en-US"/>
           </a:p>
@@ -3515,6 +3518,692 @@
       </p:grpSpPr>
       <p:sp>
         <p:nvSpPr>
+          <p:cNvPr id="2" name="Título 1">
+            <a:extLst>
+              <a:ext uri="{FF2B5EF4-FFF2-40B4-BE49-F238E27FC236}">
+                <a16:creationId xmlns:a16="http://schemas.microsoft.com/office/drawing/2014/main" id="{1333561C-1302-432D-9151-970D505D9EE5}"/>
+              </a:ext>
+            </a:extLst>
+          </p:cNvPr>
+          <p:cNvSpPr>
+            <a:spLocks noGrp="1"/>
+          </p:cNvSpPr>
+          <p:nvPr>
+            <p:ph type="title"/>
+          </p:nvPr>
+        </p:nvSpPr>
+        <p:spPr/>
+        <p:txBody>
+          <a:bodyPr/>
+          <a:lstStyle/>
+          <a:p>
+            <a:endParaRPr lang="pt-PT"/>
+          </a:p>
+        </p:txBody>
+      </p:sp>
+      <p:sp>
+        <p:nvSpPr>
+          <p:cNvPr id="3" name="Marcador de Posição de Conteúdo 2">
+            <a:extLst>
+              <a:ext uri="{FF2B5EF4-FFF2-40B4-BE49-F238E27FC236}">
+                <a16:creationId xmlns:a16="http://schemas.microsoft.com/office/drawing/2014/main" id="{5ADFCBBA-E97D-4B2A-BA0A-F6820F061D48}"/>
+              </a:ext>
+            </a:extLst>
+          </p:cNvPr>
+          <p:cNvSpPr>
+            <a:spLocks noGrp="1"/>
+          </p:cNvSpPr>
+          <p:nvPr>
+            <p:ph idx="1"/>
+          </p:nvPr>
+        </p:nvSpPr>
+        <p:spPr/>
+        <p:txBody>
+          <a:bodyPr>
+            <a:normAutofit/>
+          </a:bodyPr>
+          <a:lstStyle/>
+          <a:p>
+            <a:r>
+              <a:rPr lang="en-US" sz="4000" dirty="0"/>
+              <a:t>Question 7</a:t>
+            </a:r>
+          </a:p>
+          <a:p>
+            <a:pPr marL="571500" indent="-571500">
+              <a:buFont typeface="Arial" panose="020B0604020202020204" pitchFamily="34" charset="0"/>
+              <a:buChar char="•"/>
+            </a:pPr>
+            <a:r>
+              <a:rPr lang="en-GB" sz="3600" b="0" dirty="0">
+                <a:solidFill>
+                  <a:schemeClr val="tx1"/>
+                </a:solidFill>
+              </a:rPr>
+              <a:t>What is the adult participation in learning after leaving the formal education?</a:t>
+            </a:r>
+            <a:endParaRPr lang="pt-PT" sz="3600" b="0" dirty="0">
+              <a:solidFill>
+                <a:schemeClr val="tx1"/>
+              </a:solidFill>
+            </a:endParaRPr>
+          </a:p>
+        </p:txBody>
+      </p:sp>
+    </p:spTree>
+    <p:extLst>
+      <p:ext uri="{BB962C8B-B14F-4D97-AF65-F5344CB8AC3E}">
+        <p14:creationId xmlns:p14="http://schemas.microsoft.com/office/powerpoint/2010/main" val="1821272340"/>
+      </p:ext>
+    </p:extLst>
+  </p:cSld>
+  <p:clrMapOvr>
+    <a:masterClrMapping/>
+  </p:clrMapOvr>
+</p:sld>
+</file>
+
+<file path=ppt/slides/slide11.xml><?xml version="1.0" encoding="utf-8"?>
+<p:sld xmlns:a="http://schemas.openxmlformats.org/drawingml/2006/main" xmlns:r="http://schemas.openxmlformats.org/officeDocument/2006/relationships" xmlns:p="http://schemas.openxmlformats.org/presentationml/2006/main">
+  <p:cSld>
+    <p:spTree>
+      <p:nvGrpSpPr>
+        <p:cNvPr id="1" name=""/>
+        <p:cNvGrpSpPr/>
+        <p:nvPr/>
+      </p:nvGrpSpPr>
+      <p:grpSpPr>
+        <a:xfrm>
+          <a:off x="0" y="0"/>
+          <a:ext cx="0" cy="0"/>
+          <a:chOff x="0" y="0"/>
+          <a:chExt cx="0" cy="0"/>
+        </a:xfrm>
+      </p:grpSpPr>
+      <p:sp>
+        <p:nvSpPr>
+          <p:cNvPr id="6" name="Text Placeholder 5"/>
+          <p:cNvSpPr>
+            <a:spLocks noGrp="1"/>
+          </p:cNvSpPr>
+          <p:nvPr>
+            <p:ph type="body" sz="quarter" idx="11"/>
+          </p:nvPr>
+        </p:nvSpPr>
+        <p:spPr/>
+        <p:txBody>
+          <a:bodyPr/>
+          <a:lstStyle/>
+          <a:p>
+            <a:endParaRPr lang="en-US" dirty="0"/>
+          </a:p>
+        </p:txBody>
+      </p:sp>
+      <p:sp>
+        <p:nvSpPr>
+          <p:cNvPr id="29" name="Text Placeholder 28"/>
+          <p:cNvSpPr>
+            <a:spLocks noGrp="1"/>
+          </p:cNvSpPr>
+          <p:nvPr>
+            <p:ph type="body" sz="quarter" idx="10"/>
+          </p:nvPr>
+        </p:nvSpPr>
+        <p:spPr/>
+        <p:txBody>
+          <a:bodyPr/>
+          <a:lstStyle/>
+          <a:p>
+            <a:r>
+              <a:rPr lang="pt-PT" sz="16600" dirty="0"/>
+              <a:t>04</a:t>
+            </a:r>
+          </a:p>
+        </p:txBody>
+      </p:sp>
+      <p:sp>
+        <p:nvSpPr>
+          <p:cNvPr id="4" name="Title 3"/>
+          <p:cNvSpPr>
+            <a:spLocks noGrp="1"/>
+          </p:cNvSpPr>
+          <p:nvPr>
+            <p:ph type="title"/>
+          </p:nvPr>
+        </p:nvSpPr>
+        <p:spPr>
+          <a:xfrm>
+            <a:off x="2281222" y="3214686"/>
+            <a:ext cx="6786578" cy="3033714"/>
+          </a:xfrm>
+          <a:solidFill>
+            <a:srgbClr val="FFFFFF">
+              <a:alpha val="80000"/>
+            </a:srgbClr>
+          </a:solidFill>
+        </p:spPr>
+        <p:txBody>
+          <a:bodyPr rIns="288000">
+            <a:noAutofit/>
+          </a:bodyPr>
+          <a:lstStyle/>
+          <a:p>
+            <a:pPr marL="0" algn="r"/>
+            <a:r>
+              <a:rPr lang="pt-PT" sz="6000" dirty="0"/>
+              <a:t>Data Sample</a:t>
+            </a:r>
+          </a:p>
+        </p:txBody>
+      </p:sp>
+    </p:spTree>
+    <p:extLst>
+      <p:ext uri="{BB962C8B-B14F-4D97-AF65-F5344CB8AC3E}">
+        <p14:creationId xmlns:p14="http://schemas.microsoft.com/office/powerpoint/2010/main" val="2312607420"/>
+      </p:ext>
+    </p:extLst>
+  </p:cSld>
+  <p:clrMapOvr>
+    <a:masterClrMapping/>
+  </p:clrMapOvr>
+</p:sld>
+</file>
+
+<file path=ppt/slides/slide12.xml><?xml version="1.0" encoding="utf-8"?>
+<p:sld xmlns:a="http://schemas.openxmlformats.org/drawingml/2006/main" xmlns:r="http://schemas.openxmlformats.org/officeDocument/2006/relationships" xmlns:p="http://schemas.openxmlformats.org/presentationml/2006/main">
+  <p:cSld>
+    <p:spTree>
+      <p:nvGrpSpPr>
+        <p:cNvPr id="1" name=""/>
+        <p:cNvGrpSpPr/>
+        <p:nvPr/>
+      </p:nvGrpSpPr>
+      <p:grpSpPr>
+        <a:xfrm>
+          <a:off x="0" y="0"/>
+          <a:ext cx="0" cy="0"/>
+          <a:chOff x="0" y="0"/>
+          <a:chExt cx="0" cy="0"/>
+        </a:xfrm>
+      </p:grpSpPr>
+      <p:sp>
+        <p:nvSpPr>
+          <p:cNvPr id="2" name="Title 1"/>
+          <p:cNvSpPr>
+            <a:spLocks noGrp="1"/>
+          </p:cNvSpPr>
+          <p:nvPr>
+            <p:ph type="title"/>
+          </p:nvPr>
+        </p:nvSpPr>
+        <p:spPr/>
+        <p:txBody>
+          <a:bodyPr/>
+          <a:lstStyle/>
+          <a:p>
+            <a:r>
+              <a:rPr lang="en-US" dirty="0"/>
+              <a:t>Data Sample</a:t>
+            </a:r>
+            <a:endParaRPr lang="pt-PT" dirty="0"/>
+          </a:p>
+        </p:txBody>
+      </p:sp>
+      <p:sp>
+        <p:nvSpPr>
+          <p:cNvPr id="3" name="Content Placeholder 2"/>
+          <p:cNvSpPr>
+            <a:spLocks noGrp="1"/>
+          </p:cNvSpPr>
+          <p:nvPr>
+            <p:ph idx="1"/>
+          </p:nvPr>
+        </p:nvSpPr>
+        <p:spPr>
+          <a:xfrm>
+            <a:off x="457200" y="1094346"/>
+            <a:ext cx="8229600" cy="5214974"/>
+          </a:xfrm>
+        </p:spPr>
+        <p:txBody>
+          <a:bodyPr>
+            <a:noAutofit/>
+          </a:bodyPr>
+          <a:lstStyle/>
+          <a:p>
+            <a:pPr>
+              <a:spcBef>
+                <a:spcPts val="0"/>
+              </a:spcBef>
+            </a:pPr>
+            <a:r>
+              <a:rPr lang="en-US" sz="2000" dirty="0">
+                <a:solidFill>
+                  <a:schemeClr val="tx1"/>
+                </a:solidFill>
+                <a:latin typeface="Courier New" panose="02070309020205020404" pitchFamily="49" charset="0"/>
+                <a:cs typeface="Courier New" panose="02070309020205020404" pitchFamily="49" charset="0"/>
+              </a:rPr>
+              <a:t>(from “time_spent_reading_books_Data.csv”)</a:t>
+            </a:r>
+            <a:endParaRPr lang="pt-PT" sz="2000" dirty="0">
+              <a:solidFill>
+                <a:schemeClr val="tx1"/>
+              </a:solidFill>
+              <a:latin typeface="Courier New" panose="02070309020205020404" pitchFamily="49" charset="0"/>
+              <a:cs typeface="Courier New" panose="02070309020205020404" pitchFamily="49" charset="0"/>
+            </a:endParaRPr>
+          </a:p>
+          <a:p>
+            <a:pPr>
+              <a:spcBef>
+                <a:spcPts val="0"/>
+              </a:spcBef>
+            </a:pPr>
+            <a:r>
+              <a:rPr lang="en-US" sz="2000" dirty="0">
+                <a:solidFill>
+                  <a:schemeClr val="tx1"/>
+                </a:solidFill>
+                <a:latin typeface="Courier New" panose="02070309020205020404" pitchFamily="49" charset="0"/>
+                <a:cs typeface="Courier New" panose="02070309020205020404" pitchFamily="49" charset="0"/>
+              </a:rPr>
+              <a:t>unit; geo; time; sex; value</a:t>
+            </a:r>
+            <a:endParaRPr lang="pt-PT" sz="2000" dirty="0">
+              <a:solidFill>
+                <a:schemeClr val="tx1"/>
+              </a:solidFill>
+              <a:latin typeface="Courier New" panose="02070309020205020404" pitchFamily="49" charset="0"/>
+              <a:cs typeface="Courier New" panose="02070309020205020404" pitchFamily="49" charset="0"/>
+            </a:endParaRPr>
+          </a:p>
+          <a:p>
+            <a:pPr>
+              <a:spcBef>
+                <a:spcPts val="0"/>
+              </a:spcBef>
+            </a:pPr>
+            <a:r>
+              <a:rPr lang="en-US" sz="2000" dirty="0">
+                <a:solidFill>
+                  <a:schemeClr val="tx1"/>
+                </a:solidFill>
+                <a:latin typeface="Courier New" panose="02070309020205020404" pitchFamily="49" charset="0"/>
+                <a:cs typeface="Courier New" panose="02070309020205020404" pitchFamily="49" charset="0"/>
+              </a:rPr>
+              <a:t>time; Belgium; 2010; 4</a:t>
+            </a:r>
+            <a:endParaRPr lang="pt-PT" sz="2000" dirty="0">
+              <a:solidFill>
+                <a:schemeClr val="tx1"/>
+              </a:solidFill>
+              <a:latin typeface="Courier New" panose="02070309020205020404" pitchFamily="49" charset="0"/>
+              <a:cs typeface="Courier New" panose="02070309020205020404" pitchFamily="49" charset="0"/>
+            </a:endParaRPr>
+          </a:p>
+          <a:p>
+            <a:pPr>
+              <a:spcBef>
+                <a:spcPts val="0"/>
+              </a:spcBef>
+            </a:pPr>
+            <a:r>
+              <a:rPr lang="en-US" sz="2000" dirty="0">
+                <a:solidFill>
+                  <a:schemeClr val="tx1"/>
+                </a:solidFill>
+                <a:latin typeface="Courier New" panose="02070309020205020404" pitchFamily="49" charset="0"/>
+                <a:cs typeface="Courier New" panose="02070309020205020404" pitchFamily="49" charset="0"/>
+              </a:rPr>
+              <a:t> </a:t>
+            </a:r>
+            <a:endParaRPr lang="pt-PT" sz="2000" dirty="0">
+              <a:solidFill>
+                <a:schemeClr val="tx1"/>
+              </a:solidFill>
+              <a:latin typeface="Courier New" panose="02070309020205020404" pitchFamily="49" charset="0"/>
+              <a:cs typeface="Courier New" panose="02070309020205020404" pitchFamily="49" charset="0"/>
+            </a:endParaRPr>
+          </a:p>
+          <a:p>
+            <a:pPr>
+              <a:spcBef>
+                <a:spcPts val="0"/>
+              </a:spcBef>
+            </a:pPr>
+            <a:r>
+              <a:rPr lang="en-US" sz="2000" dirty="0">
+                <a:solidFill>
+                  <a:schemeClr val="tx1"/>
+                </a:solidFill>
+                <a:latin typeface="Courier New" panose="02070309020205020404" pitchFamily="49" charset="0"/>
+                <a:cs typeface="Courier New" panose="02070309020205020404" pitchFamily="49" charset="0"/>
+              </a:rPr>
+              <a:t>(from “underachive_reading_math_science.csv”)</a:t>
+            </a:r>
+            <a:endParaRPr lang="pt-PT" sz="2000" dirty="0">
+              <a:solidFill>
+                <a:schemeClr val="tx1"/>
+              </a:solidFill>
+              <a:latin typeface="Courier New" panose="02070309020205020404" pitchFamily="49" charset="0"/>
+              <a:cs typeface="Courier New" panose="02070309020205020404" pitchFamily="49" charset="0"/>
+            </a:endParaRPr>
+          </a:p>
+          <a:p>
+            <a:pPr>
+              <a:spcBef>
+                <a:spcPts val="0"/>
+              </a:spcBef>
+            </a:pPr>
+            <a:r>
+              <a:rPr lang="en-US" sz="2000" dirty="0">
+                <a:solidFill>
+                  <a:schemeClr val="tx1"/>
+                </a:solidFill>
+                <a:latin typeface="Courier New" panose="02070309020205020404" pitchFamily="49" charset="0"/>
+                <a:cs typeface="Courier New" panose="02070309020205020404" pitchFamily="49" charset="0"/>
+              </a:rPr>
+              <a:t>year; </a:t>
+            </a:r>
+            <a:r>
+              <a:rPr lang="en-US" sz="2000" dirty="0" err="1">
+                <a:solidFill>
+                  <a:schemeClr val="tx1"/>
+                </a:solidFill>
+                <a:latin typeface="Courier New" panose="02070309020205020404" pitchFamily="49" charset="0"/>
+                <a:cs typeface="Courier New" panose="02070309020205020404" pitchFamily="49" charset="0"/>
+              </a:rPr>
+              <a:t>training_field</a:t>
+            </a:r>
+            <a:r>
+              <a:rPr lang="en-US" sz="2000" dirty="0">
+                <a:solidFill>
+                  <a:schemeClr val="tx1"/>
+                </a:solidFill>
+                <a:latin typeface="Courier New" panose="02070309020205020404" pitchFamily="49" charset="0"/>
+                <a:cs typeface="Courier New" panose="02070309020205020404" pitchFamily="49" charset="0"/>
+              </a:rPr>
+              <a:t>; country; percentage</a:t>
+            </a:r>
+            <a:endParaRPr lang="pt-PT" sz="2000" dirty="0">
+              <a:solidFill>
+                <a:schemeClr val="tx1"/>
+              </a:solidFill>
+              <a:latin typeface="Courier New" panose="02070309020205020404" pitchFamily="49" charset="0"/>
+              <a:cs typeface="Courier New" panose="02070309020205020404" pitchFamily="49" charset="0"/>
+            </a:endParaRPr>
+          </a:p>
+          <a:p>
+            <a:pPr>
+              <a:spcBef>
+                <a:spcPts val="0"/>
+              </a:spcBef>
+            </a:pPr>
+            <a:r>
+              <a:rPr lang="en-US" sz="2000" dirty="0">
+                <a:solidFill>
+                  <a:schemeClr val="tx1"/>
+                </a:solidFill>
+                <a:latin typeface="Courier New" panose="02070309020205020404" pitchFamily="49" charset="0"/>
+                <a:cs typeface="Courier New" panose="02070309020205020404" pitchFamily="49" charset="0"/>
+              </a:rPr>
+              <a:t>2012; Mathematics; Belgium; 19.6</a:t>
+            </a:r>
+            <a:endParaRPr lang="pt-PT" sz="2000" dirty="0">
+              <a:solidFill>
+                <a:schemeClr val="tx1"/>
+              </a:solidFill>
+              <a:latin typeface="Courier New" panose="02070309020205020404" pitchFamily="49" charset="0"/>
+              <a:cs typeface="Courier New" panose="02070309020205020404" pitchFamily="49" charset="0"/>
+            </a:endParaRPr>
+          </a:p>
+          <a:p>
+            <a:pPr>
+              <a:spcBef>
+                <a:spcPts val="0"/>
+              </a:spcBef>
+            </a:pPr>
+            <a:r>
+              <a:rPr lang="en-US" sz="2000" dirty="0">
+                <a:solidFill>
+                  <a:schemeClr val="tx1"/>
+                </a:solidFill>
+                <a:latin typeface="Courier New" panose="02070309020205020404" pitchFamily="49" charset="0"/>
+                <a:cs typeface="Courier New" panose="02070309020205020404" pitchFamily="49" charset="0"/>
+              </a:rPr>
+              <a:t> </a:t>
+            </a:r>
+            <a:endParaRPr lang="pt-PT" sz="2000" dirty="0">
+              <a:solidFill>
+                <a:schemeClr val="tx1"/>
+              </a:solidFill>
+              <a:latin typeface="Courier New" panose="02070309020205020404" pitchFamily="49" charset="0"/>
+              <a:cs typeface="Courier New" panose="02070309020205020404" pitchFamily="49" charset="0"/>
+            </a:endParaRPr>
+          </a:p>
+          <a:p>
+            <a:pPr>
+              <a:spcBef>
+                <a:spcPts val="0"/>
+              </a:spcBef>
+            </a:pPr>
+            <a:r>
+              <a:rPr lang="en-US" sz="2000" dirty="0">
+                <a:solidFill>
+                  <a:schemeClr val="tx1"/>
+                </a:solidFill>
+                <a:latin typeface="Courier New" panose="02070309020205020404" pitchFamily="49" charset="0"/>
+                <a:cs typeface="Courier New" panose="02070309020205020404" pitchFamily="49" charset="0"/>
+              </a:rPr>
+              <a:t>(from “early_leavers_edu_and_training.csv”)</a:t>
+            </a:r>
+            <a:endParaRPr lang="pt-PT" sz="2000" dirty="0">
+              <a:solidFill>
+                <a:schemeClr val="tx1"/>
+              </a:solidFill>
+              <a:latin typeface="Courier New" panose="02070309020205020404" pitchFamily="49" charset="0"/>
+              <a:cs typeface="Courier New" panose="02070309020205020404" pitchFamily="49" charset="0"/>
+            </a:endParaRPr>
+          </a:p>
+          <a:p>
+            <a:pPr>
+              <a:spcBef>
+                <a:spcPts val="0"/>
+              </a:spcBef>
+            </a:pPr>
+            <a:r>
+              <a:rPr lang="en-US" sz="2000" dirty="0">
+                <a:solidFill>
+                  <a:schemeClr val="tx1"/>
+                </a:solidFill>
+                <a:latin typeface="Courier New" panose="02070309020205020404" pitchFamily="49" charset="0"/>
+                <a:cs typeface="Courier New" panose="02070309020205020404" pitchFamily="49" charset="0"/>
+              </a:rPr>
+              <a:t>year; country; percentage</a:t>
+            </a:r>
+            <a:endParaRPr lang="pt-PT" sz="2000" dirty="0">
+              <a:solidFill>
+                <a:schemeClr val="tx1"/>
+              </a:solidFill>
+              <a:latin typeface="Courier New" panose="02070309020205020404" pitchFamily="49" charset="0"/>
+              <a:cs typeface="Courier New" panose="02070309020205020404" pitchFamily="49" charset="0"/>
+            </a:endParaRPr>
+          </a:p>
+          <a:p>
+            <a:pPr>
+              <a:spcBef>
+                <a:spcPts val="0"/>
+              </a:spcBef>
+            </a:pPr>
+            <a:r>
+              <a:rPr lang="en-US" sz="2000" dirty="0">
+                <a:solidFill>
+                  <a:schemeClr val="tx1"/>
+                </a:solidFill>
+                <a:latin typeface="Courier New" panose="02070309020205020404" pitchFamily="49" charset="0"/>
+                <a:cs typeface="Courier New" panose="02070309020205020404" pitchFamily="49" charset="0"/>
+              </a:rPr>
+              <a:t>2014; Denmark; 9.5</a:t>
+            </a:r>
+            <a:endParaRPr lang="pt-PT" sz="2000" dirty="0">
+              <a:solidFill>
+                <a:schemeClr val="tx1"/>
+              </a:solidFill>
+              <a:latin typeface="Courier New" panose="02070309020205020404" pitchFamily="49" charset="0"/>
+              <a:cs typeface="Courier New" panose="02070309020205020404" pitchFamily="49" charset="0"/>
+            </a:endParaRPr>
+          </a:p>
+          <a:p>
+            <a:pPr>
+              <a:spcBef>
+                <a:spcPts val="0"/>
+              </a:spcBef>
+            </a:pPr>
+            <a:r>
+              <a:rPr lang="en-US" sz="2000" dirty="0">
+                <a:solidFill>
+                  <a:schemeClr val="tx1"/>
+                </a:solidFill>
+                <a:latin typeface="Courier New" panose="02070309020205020404" pitchFamily="49" charset="0"/>
+                <a:cs typeface="Courier New" panose="02070309020205020404" pitchFamily="49" charset="0"/>
+              </a:rPr>
+              <a:t> </a:t>
+            </a:r>
+            <a:endParaRPr lang="pt-PT" sz="2000" dirty="0">
+              <a:solidFill>
+                <a:schemeClr val="tx1"/>
+              </a:solidFill>
+              <a:latin typeface="Courier New" panose="02070309020205020404" pitchFamily="49" charset="0"/>
+              <a:cs typeface="Courier New" panose="02070309020205020404" pitchFamily="49" charset="0"/>
+            </a:endParaRPr>
+          </a:p>
+          <a:p>
+            <a:pPr>
+              <a:spcBef>
+                <a:spcPts val="0"/>
+              </a:spcBef>
+            </a:pPr>
+            <a:r>
+              <a:rPr lang="en-US" sz="2000" dirty="0">
+                <a:solidFill>
+                  <a:schemeClr val="tx1"/>
+                </a:solidFill>
+                <a:latin typeface="Courier New" panose="02070309020205020404" pitchFamily="49" charset="0"/>
+                <a:cs typeface="Courier New" panose="02070309020205020404" pitchFamily="49" charset="0"/>
+              </a:rPr>
+              <a:t>(from “household_exp_books_newspapers.csv”)</a:t>
+            </a:r>
+            <a:endParaRPr lang="pt-PT" sz="2000" dirty="0">
+              <a:solidFill>
+                <a:schemeClr val="tx1"/>
+              </a:solidFill>
+              <a:latin typeface="Courier New" panose="02070309020205020404" pitchFamily="49" charset="0"/>
+              <a:cs typeface="Courier New" panose="02070309020205020404" pitchFamily="49" charset="0"/>
+            </a:endParaRPr>
+          </a:p>
+          <a:p>
+            <a:pPr>
+              <a:spcBef>
+                <a:spcPts val="0"/>
+              </a:spcBef>
+            </a:pPr>
+            <a:r>
+              <a:rPr lang="en-US" sz="2000" dirty="0">
+                <a:solidFill>
+                  <a:schemeClr val="tx1"/>
+                </a:solidFill>
+                <a:latin typeface="Courier New" panose="02070309020205020404" pitchFamily="49" charset="0"/>
+                <a:cs typeface="Courier New" panose="02070309020205020404" pitchFamily="49" charset="0"/>
+              </a:rPr>
+              <a:t>year; country; </a:t>
+            </a:r>
+            <a:r>
+              <a:rPr lang="en-US" sz="2000" dirty="0" err="1">
+                <a:solidFill>
+                  <a:schemeClr val="tx1"/>
+                </a:solidFill>
+                <a:latin typeface="Courier New" panose="02070309020205020404" pitchFamily="49" charset="0"/>
+                <a:cs typeface="Courier New" panose="02070309020205020404" pitchFamily="49" charset="0"/>
+              </a:rPr>
+              <a:t>percentage_of_total</a:t>
+            </a:r>
+            <a:r>
+              <a:rPr lang="en-US" sz="2000" dirty="0">
+                <a:solidFill>
+                  <a:schemeClr val="tx1"/>
+                </a:solidFill>
+                <a:latin typeface="Courier New" panose="02070309020205020404" pitchFamily="49" charset="0"/>
+                <a:cs typeface="Courier New" panose="02070309020205020404" pitchFamily="49" charset="0"/>
+              </a:rPr>
+              <a:t>(value)</a:t>
+            </a:r>
+            <a:endParaRPr lang="pt-PT" sz="2000" dirty="0">
+              <a:solidFill>
+                <a:schemeClr val="tx1"/>
+              </a:solidFill>
+              <a:latin typeface="Courier New" panose="02070309020205020404" pitchFamily="49" charset="0"/>
+              <a:cs typeface="Courier New" panose="02070309020205020404" pitchFamily="49" charset="0"/>
+            </a:endParaRPr>
+          </a:p>
+          <a:p>
+            <a:pPr>
+              <a:spcBef>
+                <a:spcPts val="0"/>
+              </a:spcBef>
+            </a:pPr>
+            <a:r>
+              <a:rPr lang="en-US" sz="2000" dirty="0">
+                <a:solidFill>
+                  <a:schemeClr val="tx1"/>
+                </a:solidFill>
+                <a:latin typeface="Courier New" panose="02070309020205020404" pitchFamily="49" charset="0"/>
+                <a:cs typeface="Courier New" panose="02070309020205020404" pitchFamily="49" charset="0"/>
+              </a:rPr>
+              <a:t>2015; Ireland; 0.9</a:t>
+            </a:r>
+            <a:endParaRPr lang="pt-PT" sz="2000" dirty="0">
+              <a:solidFill>
+                <a:schemeClr val="tx1"/>
+              </a:solidFill>
+              <a:latin typeface="Courier New" panose="02070309020205020404" pitchFamily="49" charset="0"/>
+              <a:cs typeface="Courier New" panose="02070309020205020404" pitchFamily="49" charset="0"/>
+            </a:endParaRPr>
+          </a:p>
+        </p:txBody>
+      </p:sp>
+    </p:spTree>
+    <p:extLst>
+      <p:ext uri="{BB962C8B-B14F-4D97-AF65-F5344CB8AC3E}">
+        <p14:creationId xmlns:p14="http://schemas.microsoft.com/office/powerpoint/2010/main" val="2292396113"/>
+      </p:ext>
+    </p:extLst>
+  </p:cSld>
+  <p:clrMapOvr>
+    <a:masterClrMapping/>
+  </p:clrMapOvr>
+</p:sld>
+</file>
+
+<file path=ppt/slides/slide13.xml><?xml version="1.0" encoding="utf-8"?>
+<p:sld xmlns:a="http://schemas.openxmlformats.org/drawingml/2006/main" xmlns:r="http://schemas.openxmlformats.org/officeDocument/2006/relationships" xmlns:p="http://schemas.openxmlformats.org/presentationml/2006/main">
+  <p:cSld>
+    <p:spTree>
+      <p:nvGrpSpPr>
+        <p:cNvPr id="1" name=""/>
+        <p:cNvGrpSpPr/>
+        <p:nvPr/>
+      </p:nvGrpSpPr>
+      <p:grpSpPr>
+        <a:xfrm>
+          <a:off x="0" y="0"/>
+          <a:ext cx="0" cy="0"/>
+          <a:chOff x="0" y="0"/>
+          <a:chExt cx="0" cy="0"/>
+        </a:xfrm>
+      </p:grpSpPr>
+      <p:sp>
+        <p:nvSpPr>
           <p:cNvPr id="3" name="Marcador de Posição de Conteúdo 2">
             <a:extLst>
               <a:ext uri="{FF2B5EF4-FFF2-40B4-BE49-F238E27FC236}">
@@ -4155,34 +4844,49 @@
             </a:r>
           </a:p>
           <a:p>
+            <a:pPr marL="571500" indent="-571500">
+              <a:buFont typeface="Arial" panose="020B0604020202020204" pitchFamily="34" charset="0"/>
+              <a:buChar char="•"/>
+            </a:pPr>
+            <a:r>
+              <a:rPr lang="en-GB" b="0" dirty="0">
+                <a:solidFill>
+                  <a:schemeClr val="tx1"/>
+                </a:solidFill>
+              </a:rPr>
+              <a:t>How many hours, in average, do the countries in EU spend reading?</a:t>
+            </a:r>
+            <a:endParaRPr lang="en-US" sz="3600" b="0" dirty="0">
+              <a:solidFill>
+                <a:schemeClr val="tx1"/>
+              </a:solidFill>
+            </a:endParaRPr>
+          </a:p>
+          <a:p>
             <a:r>
               <a:rPr lang="en-US" sz="4000" dirty="0"/>
               <a:t>Question 2</a:t>
             </a:r>
-          </a:p>
-          <a:p>
-            <a:r>
-              <a:rPr lang="en-US" sz="4000" dirty="0"/>
-              <a:t>Question 3</a:t>
-            </a:r>
-          </a:p>
-          <a:p>
-            <a:r>
-              <a:rPr lang="en-US" sz="4000" dirty="0"/>
-              <a:t>Question 4</a:t>
-            </a:r>
-          </a:p>
-          <a:p>
-            <a:r>
-              <a:rPr lang="en-US" sz="4000" dirty="0"/>
-              <a:t>Question 5</a:t>
-            </a:r>
-          </a:p>
-          <a:p>
-            <a:endParaRPr lang="en-US" sz="4000" dirty="0"/>
-          </a:p>
-          <a:p>
-            <a:endParaRPr lang="en-US" sz="4000" dirty="0"/>
+            <a:endParaRPr lang="en-US" sz="4000" b="0" dirty="0"/>
+          </a:p>
+          <a:p>
+            <a:pPr marL="571500" indent="-571500">
+              <a:buFont typeface="Arial" panose="020B0604020202020204" pitchFamily="34" charset="0"/>
+              <a:buChar char="•"/>
+            </a:pPr>
+            <a:r>
+              <a:rPr lang="en-GB" b="0" dirty="0">
+                <a:solidFill>
+                  <a:schemeClr val="tx1"/>
+                </a:solidFill>
+              </a:rPr>
+              <a:t>What is the average percentage of household expenditure in reading material by country?</a:t>
+            </a:r>
+            <a:endParaRPr lang="en-US" b="0" dirty="0">
+              <a:solidFill>
+                <a:schemeClr val="tx1"/>
+              </a:solidFill>
+            </a:endParaRPr>
           </a:p>
         </p:txBody>
       </p:sp>
@@ -4218,12 +4922,18 @@
       </p:grpSpPr>
       <p:sp>
         <p:nvSpPr>
-          <p:cNvPr id="6" name="Text Placeholder 5"/>
-          <p:cNvSpPr>
-            <a:spLocks noGrp="1"/>
-          </p:cNvSpPr>
-          <p:nvPr>
-            <p:ph type="body" sz="quarter" idx="11"/>
+          <p:cNvPr id="2" name="Título 1">
+            <a:extLst>
+              <a:ext uri="{FF2B5EF4-FFF2-40B4-BE49-F238E27FC236}">
+                <a16:creationId xmlns:a16="http://schemas.microsoft.com/office/drawing/2014/main" id="{83AD707D-A770-4B9C-97F4-8AAB892D3017}"/>
+              </a:ext>
+            </a:extLst>
+          </p:cNvPr>
+          <p:cNvSpPr>
+            <a:spLocks noGrp="1"/>
+          </p:cNvSpPr>
+          <p:nvPr>
+            <p:ph type="title"/>
           </p:nvPr>
         </p:nvSpPr>
         <p:spPr/>
@@ -4231,71 +4941,88 @@
           <a:bodyPr/>
           <a:lstStyle/>
           <a:p>
-            <a:endParaRPr lang="en-US" dirty="0"/>
-          </a:p>
-        </p:txBody>
-      </p:sp>
-      <p:sp>
-        <p:nvSpPr>
-          <p:cNvPr id="29" name="Text Placeholder 28"/>
-          <p:cNvSpPr>
-            <a:spLocks noGrp="1"/>
-          </p:cNvSpPr>
-          <p:nvPr>
-            <p:ph type="body" sz="quarter" idx="10"/>
+            <a:endParaRPr lang="pt-PT"/>
+          </a:p>
+        </p:txBody>
+      </p:sp>
+      <p:sp>
+        <p:nvSpPr>
+          <p:cNvPr id="3" name="Marcador de Posição de Conteúdo 2">
+            <a:extLst>
+              <a:ext uri="{FF2B5EF4-FFF2-40B4-BE49-F238E27FC236}">
+                <a16:creationId xmlns:a16="http://schemas.microsoft.com/office/drawing/2014/main" id="{50C27C91-AF0B-45CD-B194-2AD18E47B328}"/>
+              </a:ext>
+            </a:extLst>
+          </p:cNvPr>
+          <p:cNvSpPr>
+            <a:spLocks noGrp="1"/>
+          </p:cNvSpPr>
+          <p:nvPr>
+            <p:ph idx="1"/>
           </p:nvPr>
         </p:nvSpPr>
         <p:spPr/>
         <p:txBody>
-          <a:bodyPr/>
-          <a:lstStyle/>
-          <a:p>
-            <a:r>
-              <a:rPr lang="pt-PT" sz="16600" dirty="0"/>
-              <a:t>04</a:t>
-            </a:r>
-          </a:p>
-        </p:txBody>
-      </p:sp>
-      <p:sp>
-        <p:nvSpPr>
-          <p:cNvPr id="4" name="Title 3"/>
-          <p:cNvSpPr>
-            <a:spLocks noGrp="1"/>
-          </p:cNvSpPr>
-          <p:nvPr>
-            <p:ph type="title"/>
-          </p:nvPr>
-        </p:nvSpPr>
-        <p:spPr>
-          <a:xfrm>
-            <a:off x="2281222" y="3214686"/>
-            <a:ext cx="6786578" cy="3033714"/>
-          </a:xfrm>
-          <a:solidFill>
-            <a:srgbClr val="FFFFFF">
-              <a:alpha val="80000"/>
-            </a:srgbClr>
-          </a:solidFill>
-        </p:spPr>
-        <p:txBody>
-          <a:bodyPr rIns="288000">
-            <a:noAutofit/>
+          <a:bodyPr>
+            <a:normAutofit lnSpcReduction="10000"/>
           </a:bodyPr>
           <a:lstStyle/>
           <a:p>
-            <a:pPr marL="0" algn="r"/>
-            <a:r>
-              <a:rPr lang="pt-PT" sz="6000" dirty="0"/>
-              <a:t>Data Sample</a:t>
-            </a:r>
+            <a:r>
+              <a:rPr lang="en-US" sz="4000" dirty="0"/>
+              <a:t>Question 3</a:t>
+            </a:r>
+          </a:p>
+          <a:p>
+            <a:pPr marL="571500" indent="-571500">
+              <a:buFont typeface="Arial" panose="020B0604020202020204" pitchFamily="34" charset="0"/>
+              <a:buChar char="•"/>
+            </a:pPr>
+            <a:r>
+              <a:rPr lang="en-GB" sz="3600" b="0" dirty="0">
+                <a:solidFill>
+                  <a:schemeClr val="tx1"/>
+                </a:solidFill>
+              </a:rPr>
+              <a:t>Given the reading habits of each country, what is the level of literacy of this country comparing to other EU countries?</a:t>
+            </a:r>
+            <a:endParaRPr lang="en-US" sz="3600" b="0" dirty="0">
+              <a:solidFill>
+                <a:schemeClr val="tx1"/>
+              </a:solidFill>
+            </a:endParaRPr>
+          </a:p>
+          <a:p>
+            <a:r>
+              <a:rPr lang="en-US" sz="4000" dirty="0"/>
+              <a:t>Question 4</a:t>
+            </a:r>
+          </a:p>
+          <a:p>
+            <a:pPr marL="571500" indent="-571500">
+              <a:buFont typeface="Arial" panose="020B0604020202020204" pitchFamily="34" charset="0"/>
+              <a:buChar char="•"/>
+            </a:pPr>
+            <a:r>
+              <a:rPr lang="en-GB" sz="3900" b="0" dirty="0">
+                <a:solidFill>
+                  <a:schemeClr val="tx1"/>
+                </a:solidFill>
+              </a:rPr>
+              <a:t>Given a country’s reading habits, what is the rate of dropout?</a:t>
+            </a:r>
+            <a:endParaRPr lang="en-US" sz="3900" b="0" dirty="0">
+              <a:solidFill>
+                <a:schemeClr val="tx1"/>
+              </a:solidFill>
+            </a:endParaRPr>
           </a:p>
         </p:txBody>
       </p:sp>
     </p:spTree>
     <p:extLst>
       <p:ext uri="{BB962C8B-B14F-4D97-AF65-F5344CB8AC3E}">
-        <p14:creationId xmlns:p14="http://schemas.microsoft.com/office/powerpoint/2010/main" val="2312607420"/>
+        <p14:creationId xmlns:p14="http://schemas.microsoft.com/office/powerpoint/2010/main" val="1281408303"/>
       </p:ext>
     </p:extLst>
   </p:cSld>
@@ -4324,7 +5051,13 @@
       </p:grpSpPr>
       <p:sp>
         <p:nvSpPr>
-          <p:cNvPr id="2" name="Title 1"/>
+          <p:cNvPr id="2" name="Título 1">
+            <a:extLst>
+              <a:ext uri="{FF2B5EF4-FFF2-40B4-BE49-F238E27FC236}">
+                <a16:creationId xmlns:a16="http://schemas.microsoft.com/office/drawing/2014/main" id="{D68C310D-363F-40FD-BF66-EA3322DE805C}"/>
+              </a:ext>
+            </a:extLst>
+          </p:cNvPr>
           <p:cNvSpPr>
             <a:spLocks noGrp="1"/>
           </p:cNvSpPr>
@@ -4337,17 +5070,19 @@
           <a:bodyPr/>
           <a:lstStyle/>
           <a:p>
-            <a:r>
-              <a:rPr lang="en-US" dirty="0"/>
-              <a:t>Data Sample</a:t>
-            </a:r>
-            <a:endParaRPr lang="pt-PT" dirty="0"/>
-          </a:p>
-        </p:txBody>
-      </p:sp>
-      <p:sp>
-        <p:nvSpPr>
-          <p:cNvPr id="3" name="Content Placeholder 2"/>
+            <a:endParaRPr lang="pt-PT"/>
+          </a:p>
+        </p:txBody>
+      </p:sp>
+      <p:sp>
+        <p:nvSpPr>
+          <p:cNvPr id="3" name="Marcador de Posição de Conteúdo 2">
+            <a:extLst>
+              <a:ext uri="{FF2B5EF4-FFF2-40B4-BE49-F238E27FC236}">
+                <a16:creationId xmlns:a16="http://schemas.microsoft.com/office/drawing/2014/main" id="{022FC356-CD21-4BD0-8A1B-190DFFF212AA}"/>
+              </a:ext>
+            </a:extLst>
+          </p:cNvPr>
           <p:cNvSpPr>
             <a:spLocks noGrp="1"/>
           </p:cNvSpPr>
@@ -4355,109 +5090,74 @@
             <p:ph idx="1"/>
           </p:nvPr>
         </p:nvSpPr>
-        <p:spPr>
-          <a:xfrm>
-            <a:off x="457200" y="1094346"/>
-            <a:ext cx="8229600" cy="5214974"/>
-          </a:xfrm>
-        </p:spPr>
+        <p:spPr/>
         <p:txBody>
           <a:bodyPr>
-            <a:noAutofit/>
+            <a:normAutofit lnSpcReduction="10000"/>
           </a:bodyPr>
           <a:lstStyle/>
           <a:p>
-            <a:pPr>
-              <a:spcBef>
-                <a:spcPts val="0"/>
-              </a:spcBef>
+            <a:r>
+              <a:rPr lang="en-US" sz="4000" dirty="0"/>
+              <a:t>Question 5</a:t>
+            </a:r>
+          </a:p>
+          <a:p>
+            <a:pPr marL="571500" indent="-571500">
+              <a:buFont typeface="Arial" panose="020B0604020202020204" pitchFamily="34" charset="0"/>
+              <a:buChar char="•"/>
             </a:pPr>
             <a:r>
-              <a:rPr lang="en-US" sz="2800" dirty="0">
+              <a:rPr lang="en-GB" sz="3600" b="0" dirty="0">
                 <a:solidFill>
                   <a:schemeClr val="tx1"/>
                 </a:solidFill>
-                <a:latin typeface="Courier New" panose="02070309020205020404" pitchFamily="49" charset="0"/>
-                <a:cs typeface="Courier New" panose="02070309020205020404" pitchFamily="49" charset="0"/>
               </a:rPr>
-              <a:t>(from “xpto.csv”)</a:t>
-            </a:r>
-            <a:endParaRPr lang="pt-PT" sz="2800" dirty="0">
+              <a:t>Is there a correlation between low habit of reading and the high academic success given a country?</a:t>
+            </a:r>
+            <a:endParaRPr lang="en-US" sz="3600" b="0" dirty="0">
               <a:solidFill>
                 <a:schemeClr val="tx1"/>
               </a:solidFill>
-              <a:latin typeface="Courier New" panose="02070309020205020404" pitchFamily="49" charset="0"/>
-              <a:cs typeface="Courier New" panose="02070309020205020404" pitchFamily="49" charset="0"/>
             </a:endParaRPr>
           </a:p>
           <a:p>
-            <a:pPr>
-              <a:spcBef>
-                <a:spcPts val="0"/>
-              </a:spcBef>
+            <a:r>
+              <a:rPr lang="en-US" sz="4000" dirty="0"/>
+              <a:t>Question 6</a:t>
+            </a:r>
+          </a:p>
+          <a:p>
+            <a:pPr marL="457200" indent="-457200">
+              <a:buFont typeface="Arial" panose="020B0604020202020204" pitchFamily="34" charset="0"/>
+              <a:buChar char="•"/>
             </a:pPr>
-            <a:endParaRPr lang="en-US" sz="2800" dirty="0">
+            <a:r>
+              <a:rPr lang="en-GB" sz="3600" b="0" dirty="0">
+                <a:solidFill>
+                  <a:schemeClr val="tx1"/>
+                </a:solidFill>
+              </a:rPr>
+              <a:t>Is there a correlation between low habit of reading and the high academic success given a country?</a:t>
+            </a:r>
+            <a:endParaRPr lang="en-US" sz="3600" b="0" dirty="0">
               <a:solidFill>
                 <a:schemeClr val="tx1"/>
               </a:solidFill>
-              <a:latin typeface="Courier New" panose="02070309020205020404" pitchFamily="49" charset="0"/>
-              <a:cs typeface="Courier New" panose="02070309020205020404" pitchFamily="49" charset="0"/>
             </a:endParaRPr>
           </a:p>
           <a:p>
-            <a:pPr>
-              <a:spcBef>
-                <a:spcPts val="0"/>
-              </a:spcBef>
-            </a:pPr>
-            <a:r>
-              <a:rPr lang="en-US" sz="2800" dirty="0">
-                <a:solidFill>
-                  <a:schemeClr val="tx1"/>
-                </a:solidFill>
-                <a:latin typeface="Courier New" panose="02070309020205020404" pitchFamily="49" charset="0"/>
-                <a:cs typeface="Courier New" panose="02070309020205020404" pitchFamily="49" charset="0"/>
-              </a:rPr>
-              <a:t>year; name; cost; rating</a:t>
-            </a:r>
-            <a:endParaRPr lang="pt-PT" sz="2800" dirty="0">
-              <a:solidFill>
-                <a:schemeClr val="tx1"/>
-              </a:solidFill>
-              <a:latin typeface="Courier New" panose="02070309020205020404" pitchFamily="49" charset="0"/>
-              <a:cs typeface="Courier New" panose="02070309020205020404" pitchFamily="49" charset="0"/>
-            </a:endParaRPr>
-          </a:p>
-          <a:p>
-            <a:pPr>
-              <a:spcBef>
-                <a:spcPts val="0"/>
-              </a:spcBef>
-            </a:pPr>
-            <a:r>
-              <a:rPr lang="en-US" sz="2800" dirty="0">
-                <a:solidFill>
-                  <a:schemeClr val="tx1"/>
-                </a:solidFill>
-                <a:latin typeface="Courier New" panose="02070309020205020404" pitchFamily="49" charset="0"/>
-                <a:cs typeface="Courier New" panose="02070309020205020404" pitchFamily="49" charset="0"/>
-              </a:rPr>
-              <a:t>2012; Potatoes; 12000; 4</a:t>
-            </a:r>
-            <a:endParaRPr lang="pt-PT" sz="2800" dirty="0">
-              <a:solidFill>
-                <a:schemeClr val="tx1"/>
-              </a:solidFill>
-              <a:latin typeface="Courier New" panose="02070309020205020404" pitchFamily="49" charset="0"/>
-              <a:cs typeface="Courier New" panose="02070309020205020404" pitchFamily="49" charset="0"/>
-            </a:endParaRPr>
+            <a:endParaRPr lang="en-US" sz="4000" dirty="0"/>
+          </a:p>
+          <a:p>
+            <a:endParaRPr lang="pt-PT" dirty="0"/>
           </a:p>
         </p:txBody>
       </p:sp>
     </p:spTree>
     <p:extLst>
       <p:ext uri="{BB962C8B-B14F-4D97-AF65-F5344CB8AC3E}">
-        <p14:creationId xmlns:p14="http://schemas.microsoft.com/office/powerpoint/2010/main" val="2292396113"/>
+        <p14:creationId xmlns:p14="http://schemas.microsoft.com/office/powerpoint/2010/main" val="2544182171"/>
       </p:ext>
     </p:extLst>
   </p:cSld>

</xml_diff>